<commit_message>
Fix issue with images being stacked
</commit_message>
<xml_diff>
--- a/C#/SEH Code Challenge/SEH  Code Challenge/SEH  Code Challenge/SEH Challenge.pptx
+++ b/C#/SEH Code Challenge/SEH  Code Challenge/SEH  Code Challenge/SEH Challenge.pptx
@@ -3316,7 +3316,7 @@
         </p:blipFill>
         <p:spPr bwMode="white">
           <a:xfrm rot="0">
-            <a:off x="6347333" y="3030093"/>
+            <a:off x="2537333" y="3030093"/>
             <a:ext cx="1778000" cy="1778000"/>
           </a:xfrm>
           <a:prstGeom prst="rect">
@@ -3347,7 +3347,7 @@
         </p:blipFill>
         <p:spPr bwMode="white">
           <a:xfrm rot="0">
-            <a:off x="6347333" y="3030093"/>
+            <a:off x="4442333" y="3030093"/>
             <a:ext cx="1778000" cy="1778000"/>
           </a:xfrm>
           <a:prstGeom prst="rect">

</xml_diff>